<commit_message>
Changes to the Plan and Comments on Papers
Renamed paper
Update plan
Update proposal
</commit_message>
<xml_diff>
--- a/Paper_TraceabilityBasedPrioritization/Writing/ProposalsToContinue.pptx
+++ b/Paper_TraceabilityBasedPrioritization/Writing/ProposalsToContinue.pptx
@@ -208,7 +208,7 @@
           <a:p>
             <a:fld id="{C294523C-C3E0-4FED-9DFC-4FFFD4E05D28}" type="datetimeFigureOut">
               <a:rPr lang="en-US" smtClean="0"/>
-              <a:t>9/30/2013</a:t>
+              <a:t>10/13/2013</a:t>
             </a:fld>
             <a:endParaRPr lang="en-US"/>
           </a:p>
@@ -1479,7 +1479,7 @@
             <a:fld id="{1D8BD707-D9CF-40AE-B4C6-C98DA3205C09}" type="datetimeFigureOut">
               <a:rPr lang="en-US" smtClean="0"/>
               <a:pPr/>
-              <a:t>9/30/2013</a:t>
+              <a:t>10/13/2013</a:t>
             </a:fld>
             <a:endParaRPr lang="en-US"/>
           </a:p>
@@ -1681,7 +1681,7 @@
             <a:fld id="{1D8BD707-D9CF-40AE-B4C6-C98DA3205C09}" type="datetimeFigureOut">
               <a:rPr lang="en-US" smtClean="0"/>
               <a:pPr/>
-              <a:t>9/30/2013</a:t>
+              <a:t>10/13/2013</a:t>
             </a:fld>
             <a:endParaRPr lang="en-US"/>
           </a:p>
@@ -1858,7 +1858,7 @@
             <a:fld id="{1D8BD707-D9CF-40AE-B4C6-C98DA3205C09}" type="datetimeFigureOut">
               <a:rPr lang="en-US" smtClean="0"/>
               <a:pPr/>
-              <a:t>9/30/2013</a:t>
+              <a:t>10/13/2013</a:t>
             </a:fld>
             <a:endParaRPr lang="en-US"/>
           </a:p>
@@ -2025,7 +2025,7 @@
             <a:fld id="{1D8BD707-D9CF-40AE-B4C6-C98DA3205C09}" type="datetimeFigureOut">
               <a:rPr lang="en-US" smtClean="0"/>
               <a:pPr/>
-              <a:t>9/30/2013</a:t>
+              <a:t>10/13/2013</a:t>
             </a:fld>
             <a:endParaRPr lang="en-US"/>
           </a:p>
@@ -2275,7 +2275,7 @@
             <a:fld id="{1D8BD707-D9CF-40AE-B4C6-C98DA3205C09}" type="datetimeFigureOut">
               <a:rPr lang="en-US" smtClean="0"/>
               <a:pPr/>
-              <a:t>9/30/2013</a:t>
+              <a:t>10/13/2013</a:t>
             </a:fld>
             <a:endParaRPr lang="en-US"/>
           </a:p>
@@ -2595,7 +2595,7 @@
             <a:fld id="{1D8BD707-D9CF-40AE-B4C6-C98DA3205C09}" type="datetimeFigureOut">
               <a:rPr lang="en-US" smtClean="0"/>
               <a:pPr/>
-              <a:t>9/30/2013</a:t>
+              <a:t>10/13/2013</a:t>
             </a:fld>
             <a:endParaRPr lang="en-US"/>
           </a:p>
@@ -3063,7 +3063,7 @@
             <a:fld id="{1D8BD707-D9CF-40AE-B4C6-C98DA3205C09}" type="datetimeFigureOut">
               <a:rPr lang="en-US" smtClean="0"/>
               <a:pPr/>
-              <a:t>9/30/2013</a:t>
+              <a:t>10/13/2013</a:t>
             </a:fld>
             <a:endParaRPr lang="en-US"/>
           </a:p>
@@ -3213,7 +3213,7 @@
             <a:fld id="{1D8BD707-D9CF-40AE-B4C6-C98DA3205C09}" type="datetimeFigureOut">
               <a:rPr lang="en-US" smtClean="0"/>
               <a:pPr/>
-              <a:t>9/30/2013</a:t>
+              <a:t>10/13/2013</a:t>
             </a:fld>
             <a:endParaRPr lang="en-US"/>
           </a:p>
@@ -3305,7 +3305,7 @@
             <a:fld id="{1D8BD707-D9CF-40AE-B4C6-C98DA3205C09}" type="datetimeFigureOut">
               <a:rPr lang="en-US" smtClean="0"/>
               <a:pPr/>
-              <a:t>9/30/2013</a:t>
+              <a:t>10/13/2013</a:t>
             </a:fld>
             <a:endParaRPr lang="en-US"/>
           </a:p>
@@ -3581,7 +3581,7 @@
             <a:fld id="{1D8BD707-D9CF-40AE-B4C6-C98DA3205C09}" type="datetimeFigureOut">
               <a:rPr lang="en-US" smtClean="0"/>
               <a:pPr/>
-              <a:t>9/30/2013</a:t>
+              <a:t>10/13/2013</a:t>
             </a:fld>
             <a:endParaRPr lang="en-US"/>
           </a:p>
@@ -3888,7 +3888,7 @@
             <a:fld id="{1D8BD707-D9CF-40AE-B4C6-C98DA3205C09}" type="datetimeFigureOut">
               <a:rPr lang="en-US" smtClean="0"/>
               <a:pPr/>
-              <a:t>9/30/2013</a:t>
+              <a:t>10/13/2013</a:t>
             </a:fld>
             <a:endParaRPr lang="en-US"/>
           </a:p>
@@ -4188,7 +4188,7 @@
             <a:fld id="{1D8BD707-D9CF-40AE-B4C6-C98DA3205C09}" type="datetimeFigureOut">
               <a:rPr lang="en-US" smtClean="0"/>
               <a:pPr/>
-              <a:t>9/30/2013</a:t>
+              <a:t>10/13/2013</a:t>
             </a:fld>
             <a:endParaRPr lang="en-US"/>
           </a:p>
@@ -4850,15 +4850,7 @@
                   <a:schemeClr val="bg1"/>
                 </a:solidFill>
               </a:rPr>
-              <a:t>Goals </a:t>
-            </a:r>
-            <a:r>
-              <a:rPr lang="pt-BR" sz="2800" dirty="0" smtClean="0">
-                <a:solidFill>
-                  <a:schemeClr val="bg1"/>
-                </a:solidFill>
-              </a:rPr>
-              <a:t>x </a:t>
+              <a:t>Goals x </a:t>
             </a:r>
             <a:r>
               <a:rPr lang="en-US" altLang="zh-CN" sz="2800" dirty="0" smtClean="0">
@@ -4886,14 +4878,14 @@
             <p:ph idx="1"/>
             <p:extLst>
               <p:ext uri="{D42A27DB-BD31-4B8C-83A1-F6EECF244321}">
-                <p14:modId xmlns:p14="http://schemas.microsoft.com/office/powerpoint/2010/main" val="3952125690"/>
+                <p14:modId xmlns:p14="http://schemas.microsoft.com/office/powerpoint/2010/main" val="2018075258"/>
               </p:ext>
             </p:extLst>
           </p:nvPr>
         </p:nvGraphicFramePr>
         <p:xfrm>
           <a:off x="304800" y="533400"/>
-          <a:ext cx="8208911" cy="5915679"/>
+          <a:ext cx="8208911" cy="5733439"/>
         </p:xfrm>
         <a:graphic>
           <a:graphicData uri="http://schemas.openxmlformats.org/drawingml/2006/table">
@@ -5395,7 +5387,15 @@
                       <a:pPr algn="ctr"/>
                       <a:r>
                         <a:rPr lang="pt-BR" dirty="0" smtClean="0"/>
-                        <a:t>E. Smoothly decline an offer</a:t>
+                        <a:t>E. </a:t>
+                      </a:r>
+                      <a:r>
+                        <a:rPr lang="pt-BR" dirty="0" smtClean="0"/>
+                        <a:t>Decline </a:t>
+                      </a:r>
+                      <a:r>
+                        <a:rPr lang="pt-BR" dirty="0" smtClean="0"/>
+                        <a:t>an offer</a:t>
                       </a:r>
                       <a:endParaRPr lang="en-US" dirty="0"/>
                     </a:p>
@@ -5574,7 +5574,7 @@
           <p:nvPr>
             <p:extLst>
               <p:ext uri="{D42A27DB-BD31-4B8C-83A1-F6EECF244321}">
-                <p14:modId xmlns:p14="http://schemas.microsoft.com/office/powerpoint/2010/main" val="233761592"/>
+                <p14:modId xmlns:p14="http://schemas.microsoft.com/office/powerpoint/2010/main" val="1842158180"/>
               </p:ext>
             </p:extLst>
           </p:nvPr>
@@ -5626,8 +5626,13 @@
                       <a:pPr algn="ctr"/>
                       <a:r>
                         <a:rPr lang="pt-BR" sz="1400" dirty="0" smtClean="0"/>
-                        <a:t>R1- Edit Substitute Pref.</a:t>
-                      </a:r>
+                        <a:t>R1- Edit Substitute </a:t>
+                      </a:r>
+                      <a:r>
+                        <a:rPr lang="pt-BR" sz="1400" dirty="0" smtClean="0"/>
+                        <a:t>info.</a:t>
+                      </a:r>
+                      <a:endParaRPr lang="pt-BR" sz="1400" dirty="0" smtClean="0"/>
                     </a:p>
                   </a:txBody>
                   <a:tcPr anchor="ctr" anchorCtr="1"/>
@@ -5656,8 +5661,13 @@
                       </a:pPr>
                       <a:r>
                         <a:rPr lang="pt-BR" sz="1400" dirty="0" smtClean="0"/>
-                        <a:t>R2- Edit Regular Teacher Information </a:t>
-                      </a:r>
+                        <a:t>R2- Edit Regular Teacher </a:t>
+                      </a:r>
+                      <a:r>
+                        <a:rPr lang="pt-BR" sz="1400" dirty="0" smtClean="0"/>
+                        <a:t>Info. </a:t>
+                      </a:r>
+                      <a:endParaRPr lang="pt-BR" sz="1400" dirty="0" smtClean="0"/>
                     </a:p>
                   </a:txBody>
                   <a:tcPr anchor="ctr" anchorCtr="1"/>
@@ -5791,8 +5801,13 @@
                       </a:pPr>
                       <a:r>
                         <a:rPr lang="pt-BR" sz="1600" dirty="0" smtClean="0"/>
-                        <a:t>R1-Edit Substitute Pref.</a:t>
-                      </a:r>
+                        <a:t>R1-Edit Substitute </a:t>
+                      </a:r>
+                      <a:r>
+                        <a:rPr lang="pt-BR" sz="1600" dirty="0" smtClean="0"/>
+                        <a:t>Info.</a:t>
+                      </a:r>
+                      <a:endParaRPr lang="pt-BR" sz="1600" dirty="0" smtClean="0"/>
                     </a:p>
                   </a:txBody>
                   <a:tcPr anchor="ctr" anchorCtr="1"/>
@@ -5924,9 +5939,16 @@
                       </a:pPr>
                       <a:r>
                         <a:rPr lang="pt-BR" sz="1600" dirty="0" smtClean="0"/>
-                        <a:t>R2- Edit Regular Teacher Information </a:t>
-                      </a:r>
-                      <a:endParaRPr lang="pt-BR" sz="1600" dirty="0" smtClean="0"/>
+                        <a:t>R2- Edit </a:t>
+                      </a:r>
+                      <a:r>
+                        <a:rPr lang="pt-BR" sz="1600" dirty="0" smtClean="0"/>
+                        <a:t>Permanent Teacher </a:t>
+                      </a:r>
+                      <a:r>
+                        <a:rPr lang="pt-BR" sz="1600" dirty="0" smtClean="0"/>
+                        <a:t>Information </a:t>
+                      </a:r>
                     </a:p>
                   </a:txBody>
                   <a:tcPr anchor="ctr" anchorCtr="1"/>
@@ -6060,7 +6082,6 @@
                         <a:rPr lang="pt-BR" sz="1600" dirty="0" smtClean="0"/>
                         <a:t>R3-Compute Ranking of Substitutes</a:t>
                       </a:r>
-                      <a:endParaRPr lang="pt-BR" sz="1600" dirty="0" smtClean="0"/>
                     </a:p>
                   </a:txBody>
                   <a:tcPr anchor="ctr" anchorCtr="1"/>
@@ -6536,7 +6557,7 @@
           <p:nvPr>
             <p:extLst>
               <p:ext uri="{D42A27DB-BD31-4B8C-83A1-F6EECF244321}">
-                <p14:modId xmlns:p14="http://schemas.microsoft.com/office/powerpoint/2010/main" val="371730386"/>
+                <p14:modId xmlns:p14="http://schemas.microsoft.com/office/powerpoint/2010/main" val="3990134862"/>
               </p:ext>
             </p:extLst>
           </p:nvPr>
@@ -6583,8 +6604,13 @@
                       <a:pPr algn="ctr"/>
                       <a:r>
                         <a:rPr lang="pt-BR" sz="1400" dirty="0" smtClean="0"/>
-                        <a:t>R1- Edit Substitute Pref.</a:t>
-                      </a:r>
+                        <a:t>R1- Edit Substitute </a:t>
+                      </a:r>
+                      <a:r>
+                        <a:rPr lang="pt-BR" sz="1400" dirty="0" smtClean="0"/>
+                        <a:t>Info.</a:t>
+                      </a:r>
+                      <a:endParaRPr lang="pt-BR" sz="1400" dirty="0" smtClean="0"/>
                     </a:p>
                   </a:txBody>
                   <a:tcPr anchor="ctr" anchorCtr="1"/>
@@ -6613,7 +6639,15 @@
                       </a:pPr>
                       <a:r>
                         <a:rPr lang="pt-BR" sz="1400" dirty="0" smtClean="0"/>
-                        <a:t>R2- Edit Regular Teacher Information </a:t>
+                        <a:t>R2- Edit </a:t>
+                      </a:r>
+                      <a:r>
+                        <a:rPr lang="pt-BR" sz="1400" dirty="0" smtClean="0"/>
+                        <a:t>Permanent Teacher </a:t>
+                      </a:r>
+                      <a:r>
+                        <a:rPr lang="pt-BR" sz="1400" dirty="0" smtClean="0"/>
+                        <a:t>Information </a:t>
                       </a:r>
                     </a:p>
                   </a:txBody>
@@ -9486,14 +9520,14 @@
           <p:nvPr>
             <p:extLst>
               <p:ext uri="{D42A27DB-BD31-4B8C-83A1-F6EECF244321}">
-                <p14:modId xmlns:p14="http://schemas.microsoft.com/office/powerpoint/2010/main" val="1003180893"/>
+                <p14:modId xmlns:p14="http://schemas.microsoft.com/office/powerpoint/2010/main" val="4096117121"/>
               </p:ext>
             </p:extLst>
           </p:nvPr>
         </p:nvGraphicFramePr>
         <p:xfrm>
           <a:off x="533400" y="1298873"/>
-          <a:ext cx="8208910" cy="3790430"/>
+          <a:ext cx="8208910" cy="4176210"/>
         </p:xfrm>
         <a:graphic>
           <a:graphicData uri="http://schemas.openxmlformats.org/drawingml/2006/table">
@@ -9606,12 +9640,32 @@
                     <a:bodyPr/>
                     <a:lstStyle/>
                     <a:p>
-                      <a:pPr algn="ctr"/>
-                      <a:r>
-                        <a:rPr lang="pt-BR" dirty="0" smtClean="0"/>
-                        <a:t>R1</a:t>
-                      </a:r>
-                      <a:endParaRPr lang="en-US" dirty="0"/>
+                      <a:pPr marL="0" marR="0" indent="0" algn="ctr" defTabSz="914400" rtl="0" eaLnBrk="1" fontAlgn="auto" latinLnBrk="0" hangingPunct="1">
+                        <a:lnSpc>
+                          <a:spcPct val="100000"/>
+                        </a:lnSpc>
+                        <a:spcBef>
+                          <a:spcPts val="0"/>
+                        </a:spcBef>
+                        <a:spcAft>
+                          <a:spcPts val="0"/>
+                        </a:spcAft>
+                        <a:buClrTx/>
+                        <a:buSzTx/>
+                        <a:buFontTx/>
+                        <a:buNone/>
+                        <a:tabLst/>
+                        <a:defRPr/>
+                      </a:pPr>
+                      <a:r>
+                        <a:rPr lang="pt-BR" sz="1600" dirty="0" smtClean="0"/>
+                        <a:t>R1-Edit Substitute </a:t>
+                      </a:r>
+                      <a:r>
+                        <a:rPr lang="pt-BR" sz="1600" dirty="0" smtClean="0"/>
+                        <a:t>Information</a:t>
+                      </a:r>
+                      <a:endParaRPr lang="pt-BR" sz="1600" dirty="0" smtClean="0"/>
                     </a:p>
                   </a:txBody>
                   <a:tcPr anchor="ctr" anchorCtr="1"/>
@@ -9683,12 +9737,43 @@
                     <a:bodyPr/>
                     <a:lstStyle/>
                     <a:p>
-                      <a:pPr algn="ctr"/>
-                      <a:r>
-                        <a:rPr lang="pt-BR" dirty="0" smtClean="0"/>
-                        <a:t>R2</a:t>
-                      </a:r>
-                      <a:endParaRPr lang="en-US" dirty="0"/>
+                      <a:pPr marL="0" marR="0" indent="0" algn="ctr" defTabSz="914400" rtl="0" eaLnBrk="1" fontAlgn="auto" latinLnBrk="0" hangingPunct="1">
+                        <a:lnSpc>
+                          <a:spcPct val="100000"/>
+                        </a:lnSpc>
+                        <a:spcBef>
+                          <a:spcPts val="0"/>
+                        </a:spcBef>
+                        <a:spcAft>
+                          <a:spcPts val="0"/>
+                        </a:spcAft>
+                        <a:buClrTx/>
+                        <a:buSzTx/>
+                        <a:buFontTx/>
+                        <a:buNone/>
+                        <a:tabLst/>
+                        <a:defRPr/>
+                      </a:pPr>
+                      <a:r>
+                        <a:rPr lang="pt-BR" sz="1600" dirty="0" smtClean="0"/>
+                        <a:t>R2- Edit </a:t>
+                      </a:r>
+                      <a:r>
+                        <a:rPr lang="pt-BR" sz="1600" dirty="0" smtClean="0"/>
+                        <a:t>Permament</a:t>
+                      </a:r>
+                      <a:r>
+                        <a:rPr lang="pt-BR" sz="1600" baseline="0" dirty="0" smtClean="0"/>
+                        <a:t> </a:t>
+                      </a:r>
+                      <a:r>
+                        <a:rPr lang="pt-BR" sz="1600" dirty="0" smtClean="0"/>
+                        <a:t>Teacher </a:t>
+                      </a:r>
+                      <a:r>
+                        <a:rPr lang="pt-BR" sz="1600" dirty="0" smtClean="0"/>
+                        <a:t>Information </a:t>
+                      </a:r>
                     </a:p>
                   </a:txBody>
                   <a:tcPr anchor="ctr" anchorCtr="1"/>
@@ -9760,12 +9845,27 @@
                     <a:bodyPr/>
                     <a:lstStyle/>
                     <a:p>
-                      <a:pPr algn="ctr"/>
-                      <a:r>
-                        <a:rPr lang="pt-BR" dirty="0" smtClean="0"/>
-                        <a:t>R3</a:t>
-                      </a:r>
-                      <a:endParaRPr lang="en-US" dirty="0"/>
+                      <a:pPr marL="0" marR="0" indent="0" algn="ctr" defTabSz="914400" rtl="0" eaLnBrk="1" fontAlgn="auto" latinLnBrk="0" hangingPunct="1">
+                        <a:lnSpc>
+                          <a:spcPct val="100000"/>
+                        </a:lnSpc>
+                        <a:spcBef>
+                          <a:spcPts val="0"/>
+                        </a:spcBef>
+                        <a:spcAft>
+                          <a:spcPts val="0"/>
+                        </a:spcAft>
+                        <a:buClrTx/>
+                        <a:buSzTx/>
+                        <a:buFontTx/>
+                        <a:buNone/>
+                        <a:tabLst/>
+                        <a:defRPr/>
+                      </a:pPr>
+                      <a:r>
+                        <a:rPr lang="pt-BR" sz="1600" dirty="0" smtClean="0"/>
+                        <a:t>R3-Compute Ranking of Substitutes</a:t>
+                      </a:r>
                     </a:p>
                   </a:txBody>
                   <a:tcPr anchor="ctr" anchorCtr="1"/>
@@ -9839,10 +9939,10 @@
                     <a:p>
                       <a:pPr algn="ctr"/>
                       <a:r>
-                        <a:rPr lang="pt-BR" dirty="0" smtClean="0"/>
-                        <a:t>R4</a:t>
-                      </a:r>
-                      <a:endParaRPr lang="en-US" dirty="0"/>
+                        <a:rPr lang="pt-BR" sz="1600" dirty="0" smtClean="0"/>
+                        <a:t>R4- Generate Statistical Report</a:t>
+                      </a:r>
+                      <a:endParaRPr lang="en-US" sz="1600" dirty="0"/>
                     </a:p>
                   </a:txBody>
                   <a:tcPr anchor="ctr" anchorCtr="1"/>
@@ -9914,12 +10014,36 @@
                     <a:bodyPr/>
                     <a:lstStyle/>
                     <a:p>
-                      <a:pPr algn="ctr"/>
-                      <a:r>
-                        <a:rPr lang="pt-BR" dirty="0" smtClean="0"/>
-                        <a:t>R5</a:t>
-                      </a:r>
-                      <a:endParaRPr lang="en-US" dirty="0"/>
+                      <a:pPr marL="0" marR="0" indent="0" algn="ctr" defTabSz="914400" rtl="0" eaLnBrk="1" fontAlgn="auto" latinLnBrk="0" hangingPunct="1">
+                        <a:lnSpc>
+                          <a:spcPct val="100000"/>
+                        </a:lnSpc>
+                        <a:spcBef>
+                          <a:spcPts val="0"/>
+                        </a:spcBef>
+                        <a:spcAft>
+                          <a:spcPts val="0"/>
+                        </a:spcAft>
+                        <a:buClrTx/>
+                        <a:buSzTx/>
+                        <a:buFontTx/>
+                        <a:buNone/>
+                        <a:tabLst/>
+                        <a:defRPr/>
+                      </a:pPr>
+                      <a:r>
+                        <a:rPr lang="pt-BR" sz="1600" dirty="0" smtClean="0"/>
+                        <a:t>R5-</a:t>
+                      </a:r>
+                      <a:r>
+                        <a:rPr lang="pt-BR" sz="1600" baseline="0" dirty="0" smtClean="0"/>
+                        <a:t> </a:t>
+                      </a:r>
+                      <a:r>
+                        <a:rPr lang="pt-BR" sz="1600" dirty="0" smtClean="0"/>
+                        <a:t>Accept/Decline Substitution </a:t>
+                      </a:r>
+                      <a:endParaRPr lang="en-US" sz="1600" dirty="0" smtClean="0"/>
                     </a:p>
                   </a:txBody>
                   <a:tcPr anchor="ctr" anchorCtr="1"/>
@@ -9997,8 +10121,8 @@
         </p:nvSpPr>
         <p:spPr>
           <a:xfrm>
-            <a:off x="4238108" y="2506606"/>
-            <a:ext cx="2271955" cy="1285103"/>
+            <a:off x="4038601" y="2667000"/>
+            <a:ext cx="2505510" cy="1447800"/>
           </a:xfrm>
           <a:custGeom>
             <a:avLst/>
@@ -10979,7 +11103,7 @@
         </p:nvSpPr>
         <p:spPr>
           <a:xfrm>
-            <a:off x="5955763" y="3795827"/>
+            <a:off x="5944413" y="4191000"/>
             <a:ext cx="2367733" cy="749644"/>
           </a:xfrm>
           <a:custGeom>
@@ -13089,7 +13213,11 @@
             <a:pPr lvl="1"/>
             <a:r>
               <a:rPr lang="pt-BR" dirty="0" smtClean="0"/>
-              <a:t>Hired Teachers: </a:t>
+              <a:t>Permanent Teachers</a:t>
+            </a:r>
+            <a:r>
+              <a:rPr lang="pt-BR" dirty="0" smtClean="0"/>
+              <a:t>: </a:t>
             </a:r>
           </a:p>
           <a:p>

</xml_diff>